<commit_message>
Update of the section 5
</commit_message>
<xml_diff>
--- a/papier/odsi_wp1wp3/figures/layers.pptx
+++ b/papier/odsi_wp1wp3/figures/layers.pptx
@@ -247,7 +247,7 @@
             <a:fld id="{14F63557-65CD-470F-8999-4C3C411BE899}" type="datetimeFigureOut">
               <a:rPr lang="en-GB" smtClean="0"/>
               <a:pPr/>
-              <a:t>16/03/2018</a:t>
+              <a:t>19/03/2018</a:t>
             </a:fld>
             <a:endParaRPr lang="en-GB"/>
           </a:p>
@@ -4728,18 +4728,7 @@
                 <a:ea typeface="CMU Sans Serif" panose="02000603000000000000" pitchFamily="2" charset="0"/>
                 <a:cs typeface="CMU Sans Serif" panose="02000603000000000000" pitchFamily="2" charset="0"/>
               </a:rPr>
-              <a:t>Dom1 </a:t>
-            </a:r>
-            <a:r>
-              <a:rPr lang="fr-FR" sz="1400" dirty="0" smtClean="0">
-                <a:solidFill>
-                  <a:srgbClr val="000000"/>
-                </a:solidFill>
-                <a:latin typeface="CMU Sans Serif" panose="02000603000000000000" pitchFamily="2" charset="0"/>
-                <a:ea typeface="CMU Sans Serif" panose="02000603000000000000" pitchFamily="2" charset="0"/>
-                <a:cs typeface="CMU Sans Serif" panose="02000603000000000000" pitchFamily="2" charset="0"/>
-              </a:rPr>
-              <a:t>CM</a:t>
+              <a:t>Dom1 CM</a:t>
             </a:r>
           </a:p>
         </p:txBody>
@@ -4800,18 +4789,7 @@
                 <a:ea typeface="CMU Sans Serif" panose="02000603000000000000" pitchFamily="2" charset="0"/>
                 <a:cs typeface="CMU Sans Serif" panose="02000603000000000000" pitchFamily="2" charset="0"/>
               </a:rPr>
-              <a:t>Dom2 </a:t>
-            </a:r>
-            <a:r>
-              <a:rPr lang="fr-FR" sz="1400" dirty="0" smtClean="0">
-                <a:solidFill>
-                  <a:srgbClr val="000000"/>
-                </a:solidFill>
-                <a:latin typeface="CMU Sans Serif" panose="02000603000000000000" pitchFamily="2" charset="0"/>
-                <a:ea typeface="CMU Sans Serif" panose="02000603000000000000" pitchFamily="2" charset="0"/>
-                <a:cs typeface="CMU Sans Serif" panose="02000603000000000000" pitchFamily="2" charset="0"/>
-              </a:rPr>
-              <a:t>CM</a:t>
+              <a:t>Dom2 CM</a:t>
             </a:r>
           </a:p>
         </p:txBody>
@@ -4869,8 +4847,27 @@
                 <a:ea typeface="CMU Sans Serif" panose="02000603000000000000" pitchFamily="2" charset="0"/>
                 <a:cs typeface="CMU Sans Serif" panose="02000603000000000000" pitchFamily="2" charset="0"/>
               </a:rPr>
-              <a:t>Dom0 – Manufacturer</a:t>
-            </a:r>
+              <a:t>Dom0 – </a:t>
+            </a:r>
+            <a:r>
+              <a:rPr lang="fr-FR" sz="1400" dirty="0" err="1" smtClean="0">
+                <a:solidFill>
+                  <a:srgbClr val="000000"/>
+                </a:solidFill>
+                <a:latin typeface="CMU Sans Serif" panose="02000603000000000000" pitchFamily="2" charset="0"/>
+                <a:ea typeface="CMU Sans Serif" panose="02000603000000000000" pitchFamily="2" charset="0"/>
+                <a:cs typeface="CMU Sans Serif" panose="02000603000000000000" pitchFamily="2" charset="0"/>
+              </a:rPr>
+              <a:t>Owner</a:t>
+            </a:r>
+            <a:endParaRPr lang="fr-FR" sz="1400" dirty="0" smtClean="0">
+              <a:solidFill>
+                <a:srgbClr val="000000"/>
+              </a:solidFill>
+              <a:latin typeface="CMU Sans Serif" panose="02000603000000000000" pitchFamily="2" charset="0"/>
+              <a:ea typeface="CMU Sans Serif" panose="02000603000000000000" pitchFamily="2" charset="0"/>
+              <a:cs typeface="CMU Sans Serif" panose="02000603000000000000" pitchFamily="2" charset="0"/>
+            </a:endParaRPr>
           </a:p>
           <a:p>
             <a:pPr algn="ctr"/>
@@ -4987,18 +4984,7 @@
                 <a:ea typeface="CMU Sans Serif" panose="02000603000000000000" pitchFamily="2" charset="0"/>
                 <a:cs typeface="CMU Sans Serif" panose="02000603000000000000" pitchFamily="2" charset="0"/>
               </a:rPr>
-              <a:t>Dom1 </a:t>
-            </a:r>
-            <a:r>
-              <a:rPr lang="fr-FR" sz="1400" dirty="0" smtClean="0">
-                <a:solidFill>
-                  <a:srgbClr val="000000"/>
-                </a:solidFill>
-                <a:latin typeface="CMU Sans Serif" panose="02000603000000000000" pitchFamily="2" charset="0"/>
-                <a:ea typeface="CMU Sans Serif" panose="02000603000000000000" pitchFamily="2" charset="0"/>
-                <a:cs typeface="CMU Sans Serif" panose="02000603000000000000" pitchFamily="2" charset="0"/>
-              </a:rPr>
-              <a:t>– </a:t>
+              <a:t>Dom1 – </a:t>
             </a:r>
             <a:r>
               <a:rPr lang="fr-FR" sz="1400" dirty="0" err="1" smtClean="0">
@@ -5077,29 +5063,7 @@
                 <a:ea typeface="CMU Sans Serif" panose="02000603000000000000" pitchFamily="2" charset="0"/>
                 <a:cs typeface="CMU Sans Serif" panose="02000603000000000000" pitchFamily="2" charset="0"/>
               </a:rPr>
-              <a:t>Dom2 </a:t>
-            </a:r>
-            <a:r>
-              <a:rPr lang="fr-FR" sz="1400" dirty="0" smtClean="0">
-                <a:solidFill>
-                  <a:srgbClr val="000000"/>
-                </a:solidFill>
-                <a:latin typeface="CMU Sans Serif" panose="02000603000000000000" pitchFamily="2" charset="0"/>
-                <a:ea typeface="CMU Sans Serif" panose="02000603000000000000" pitchFamily="2" charset="0"/>
-                <a:cs typeface="CMU Sans Serif" panose="02000603000000000000" pitchFamily="2" charset="0"/>
-              </a:rPr>
-              <a:t>– </a:t>
-            </a:r>
-            <a:r>
-              <a:rPr lang="fr-FR" sz="1400" dirty="0" smtClean="0">
-                <a:solidFill>
-                  <a:srgbClr val="000000"/>
-                </a:solidFill>
-                <a:latin typeface="CMU Sans Serif" panose="02000603000000000000" pitchFamily="2" charset="0"/>
-                <a:ea typeface="CMU Sans Serif" panose="02000603000000000000" pitchFamily="2" charset="0"/>
-                <a:cs typeface="CMU Sans Serif" panose="02000603000000000000" pitchFamily="2" charset="0"/>
-              </a:rPr>
-              <a:t>Service </a:t>
+              <a:t>Dom2 – Service </a:t>
             </a:r>
             <a:r>
               <a:rPr lang="fr-FR" sz="1400" dirty="0" err="1" smtClean="0">
@@ -5494,14 +5458,6 @@
               </a:rPr>
               <a:t>Sens. Driver</a:t>
             </a:r>
-            <a:endParaRPr lang="fr-FR" sz="1400" dirty="0" smtClean="0">
-              <a:solidFill>
-                <a:srgbClr val="000000"/>
-              </a:solidFill>
-              <a:latin typeface="CMU Sans Serif" panose="02000603000000000000" pitchFamily="2" charset="0"/>
-              <a:ea typeface="CMU Sans Serif" panose="02000603000000000000" pitchFamily="2" charset="0"/>
-              <a:cs typeface="CMU Sans Serif" panose="02000603000000000000" pitchFamily="2" charset="0"/>
-            </a:endParaRPr>
           </a:p>
         </p:txBody>
       </p:sp>
@@ -5573,14 +5529,6 @@
               </a:rPr>
               <a:t> Sens Mgr</a:t>
             </a:r>
-            <a:endParaRPr lang="fr-FR" sz="1400" dirty="0" smtClean="0">
-              <a:solidFill>
-                <a:srgbClr val="000000"/>
-              </a:solidFill>
-              <a:latin typeface="CMU Sans Serif" panose="02000603000000000000" pitchFamily="2" charset="0"/>
-              <a:ea typeface="CMU Sans Serif" panose="02000603000000000000" pitchFamily="2" charset="0"/>
-              <a:cs typeface="CMU Sans Serif" panose="02000603000000000000" pitchFamily="2" charset="0"/>
-            </a:endParaRPr>
           </a:p>
         </p:txBody>
       </p:sp>
@@ -5674,14 +5622,6 @@
               </a:rPr>
               <a:t> Mgr</a:t>
             </a:r>
-            <a:endParaRPr lang="fr-FR" sz="1400" dirty="0" smtClean="0">
-              <a:solidFill>
-                <a:srgbClr val="000000"/>
-              </a:solidFill>
-              <a:latin typeface="CMU Sans Serif" panose="02000603000000000000" pitchFamily="2" charset="0"/>
-              <a:ea typeface="CMU Sans Serif" panose="02000603000000000000" pitchFamily="2" charset="0"/>
-              <a:cs typeface="CMU Sans Serif" panose="02000603000000000000" pitchFamily="2" charset="0"/>
-            </a:endParaRPr>
           </a:p>
         </p:txBody>
       </p:sp>
@@ -5753,14 +5693,6 @@
               </a:rPr>
               <a:t>. Driver</a:t>
             </a:r>
-            <a:endParaRPr lang="fr-FR" sz="1400" dirty="0" smtClean="0">
-              <a:solidFill>
-                <a:srgbClr val="000000"/>
-              </a:solidFill>
-              <a:latin typeface="CMU Sans Serif" panose="02000603000000000000" pitchFamily="2" charset="0"/>
-              <a:ea typeface="CMU Sans Serif" panose="02000603000000000000" pitchFamily="2" charset="0"/>
-              <a:cs typeface="CMU Sans Serif" panose="02000603000000000000" pitchFamily="2" charset="0"/>
-            </a:endParaRPr>
           </a:p>
         </p:txBody>
       </p:sp>
@@ -5821,14 +5753,6 @@
               </a:rPr>
               <a:t>NW Driver</a:t>
             </a:r>
-            <a:endParaRPr lang="fr-FR" sz="1400" dirty="0" smtClean="0">
-              <a:solidFill>
-                <a:srgbClr val="000000"/>
-              </a:solidFill>
-              <a:latin typeface="CMU Sans Serif" panose="02000603000000000000" pitchFamily="2" charset="0"/>
-              <a:ea typeface="CMU Sans Serif" panose="02000603000000000000" pitchFamily="2" charset="0"/>
-              <a:cs typeface="CMU Sans Serif" panose="02000603000000000000" pitchFamily="2" charset="0"/>
-            </a:endParaRPr>
           </a:p>
         </p:txBody>
       </p:sp>
@@ -5898,27 +5822,8 @@
                 <a:ea typeface="CMU Sans Serif" panose="02000603000000000000" pitchFamily="2" charset="0"/>
                 <a:cs typeface="CMU Sans Serif" panose="02000603000000000000" pitchFamily="2" charset="0"/>
               </a:rPr>
-              <a:t> NW</a:t>
-            </a:r>
-            <a:r>
-              <a:rPr lang="fr-FR" sz="1400" dirty="0" smtClean="0">
-                <a:solidFill>
-                  <a:srgbClr val="000000"/>
-                </a:solidFill>
-                <a:latin typeface="CMU Sans Serif" panose="02000603000000000000" pitchFamily="2" charset="0"/>
-                <a:ea typeface="CMU Sans Serif" panose="02000603000000000000" pitchFamily="2" charset="0"/>
-                <a:cs typeface="CMU Sans Serif" panose="02000603000000000000" pitchFamily="2" charset="0"/>
-              </a:rPr>
-              <a:t> Mgr</a:t>
-            </a:r>
-            <a:endParaRPr lang="fr-FR" sz="1400" dirty="0" smtClean="0">
-              <a:solidFill>
-                <a:srgbClr val="000000"/>
-              </a:solidFill>
-              <a:latin typeface="CMU Sans Serif" panose="02000603000000000000" pitchFamily="2" charset="0"/>
-              <a:ea typeface="CMU Sans Serif" panose="02000603000000000000" pitchFamily="2" charset="0"/>
-              <a:cs typeface="CMU Sans Serif" panose="02000603000000000000" pitchFamily="2" charset="0"/>
-            </a:endParaRPr>
+              <a:t> NW Mgr</a:t>
+            </a:r>
           </a:p>
         </p:txBody>
       </p:sp>
@@ -6012,14 +5917,6 @@
               </a:rPr>
               <a:t>Updater</a:t>
             </a:r>
-            <a:endParaRPr lang="fr-FR" sz="1400" dirty="0" smtClean="0">
-              <a:solidFill>
-                <a:srgbClr val="000000"/>
-              </a:solidFill>
-              <a:latin typeface="CMU Sans Serif" panose="02000603000000000000" pitchFamily="2" charset="0"/>
-              <a:ea typeface="CMU Sans Serif" panose="02000603000000000000" pitchFamily="2" charset="0"/>
-              <a:cs typeface="CMU Sans Serif" panose="02000603000000000000" pitchFamily="2" charset="0"/>
-            </a:endParaRPr>
           </a:p>
         </p:txBody>
       </p:sp>
@@ -6113,14 +6010,6 @@
               </a:rPr>
               <a:t> Updater</a:t>
             </a:r>
-            <a:endParaRPr lang="fr-FR" sz="1400" dirty="0" smtClean="0">
-              <a:solidFill>
-                <a:srgbClr val="000000"/>
-              </a:solidFill>
-              <a:latin typeface="CMU Sans Serif" panose="02000603000000000000" pitchFamily="2" charset="0"/>
-              <a:ea typeface="CMU Sans Serif" panose="02000603000000000000" pitchFamily="2" charset="0"/>
-              <a:cs typeface="CMU Sans Serif" panose="02000603000000000000" pitchFamily="2" charset="0"/>
-            </a:endParaRPr>
           </a:p>
         </p:txBody>
       </p:sp>
@@ -6192,14 +6081,6 @@
               </a:rPr>
               <a:t> Sens</a:t>
             </a:r>
-            <a:endParaRPr lang="fr-FR" sz="1400" dirty="0" smtClean="0">
-              <a:solidFill>
-                <a:srgbClr val="000000"/>
-              </a:solidFill>
-              <a:latin typeface="CMU Sans Serif" panose="02000603000000000000" pitchFamily="2" charset="0"/>
-              <a:ea typeface="CMU Sans Serif" panose="02000603000000000000" pitchFamily="2" charset="0"/>
-              <a:cs typeface="CMU Sans Serif" panose="02000603000000000000" pitchFamily="2" charset="0"/>
-            </a:endParaRPr>
           </a:p>
         </p:txBody>
       </p:sp>
@@ -6350,14 +6231,6 @@
               </a:rPr>
               <a:t>App2</a:t>
             </a:r>
-            <a:endParaRPr lang="fr-FR" sz="1400" dirty="0" smtClean="0">
-              <a:solidFill>
-                <a:srgbClr val="000000"/>
-              </a:solidFill>
-              <a:latin typeface="CMU Sans Serif" panose="02000603000000000000" pitchFamily="2" charset="0"/>
-              <a:ea typeface="CMU Sans Serif" panose="02000603000000000000" pitchFamily="2" charset="0"/>
-              <a:cs typeface="CMU Sans Serif" panose="02000603000000000000" pitchFamily="2" charset="0"/>
-            </a:endParaRPr>
           </a:p>
         </p:txBody>
       </p:sp>
@@ -6491,14 +6364,6 @@
               </a:rPr>
               <a:t>.</a:t>
             </a:r>
-            <a:endParaRPr lang="fr-FR" sz="1400" dirty="0" smtClean="0">
-              <a:solidFill>
-                <a:srgbClr val="000000"/>
-              </a:solidFill>
-              <a:latin typeface="CMU Sans Serif" panose="02000603000000000000" pitchFamily="2" charset="0"/>
-              <a:ea typeface="CMU Sans Serif" panose="02000603000000000000" pitchFamily="2" charset="0"/>
-              <a:cs typeface="CMU Sans Serif" panose="02000603000000000000" pitchFamily="2" charset="0"/>
-            </a:endParaRPr>
           </a:p>
         </p:txBody>
       </p:sp>
@@ -6651,14 +6516,6 @@
               </a:rPr>
               <a:t>Admin Mgr</a:t>
             </a:r>
-            <a:endParaRPr lang="fr-FR" sz="1400" dirty="0" smtClean="0">
-              <a:solidFill>
-                <a:srgbClr val="000000"/>
-              </a:solidFill>
-              <a:latin typeface="CMU Sans Serif" panose="02000603000000000000" pitchFamily="2" charset="0"/>
-              <a:ea typeface="CMU Sans Serif" panose="02000603000000000000" pitchFamily="2" charset="0"/>
-              <a:cs typeface="CMU Sans Serif" panose="02000603000000000000" pitchFamily="2" charset="0"/>
-            </a:endParaRPr>
           </a:p>
         </p:txBody>
       </p:sp>
@@ -6868,14 +6725,6 @@
               </a:rPr>
               <a:t>.</a:t>
             </a:r>
-            <a:endParaRPr lang="fr-FR" sz="1400" dirty="0" smtClean="0">
-              <a:solidFill>
-                <a:srgbClr val="000000"/>
-              </a:solidFill>
-              <a:latin typeface="CMU Sans Serif" panose="02000603000000000000" pitchFamily="2" charset="0"/>
-              <a:ea typeface="CMU Sans Serif" panose="02000603000000000000" pitchFamily="2" charset="0"/>
-              <a:cs typeface="CMU Sans Serif" panose="02000603000000000000" pitchFamily="2" charset="0"/>
-            </a:endParaRPr>
           </a:p>
         </p:txBody>
       </p:sp>
@@ -7020,14 +6869,6 @@
               </a:rPr>
               <a:t>Admin Mgr</a:t>
             </a:r>
-            <a:endParaRPr lang="fr-FR" sz="1400" dirty="0" smtClean="0">
-              <a:solidFill>
-                <a:srgbClr val="000000"/>
-              </a:solidFill>
-              <a:latin typeface="CMU Sans Serif" panose="02000603000000000000" pitchFamily="2" charset="0"/>
-              <a:ea typeface="CMU Sans Serif" panose="02000603000000000000" pitchFamily="2" charset="0"/>
-              <a:cs typeface="CMU Sans Serif" panose="02000603000000000000" pitchFamily="2" charset="0"/>
-            </a:endParaRPr>
           </a:p>
         </p:txBody>
       </p:sp>
@@ -7233,14 +7074,6 @@
               </a:rPr>
               <a:t>.</a:t>
             </a:r>
-            <a:endParaRPr lang="fr-FR" sz="1400" dirty="0" smtClean="0">
-              <a:solidFill>
-                <a:srgbClr val="000000"/>
-              </a:solidFill>
-              <a:latin typeface="CMU Sans Serif" panose="02000603000000000000" pitchFamily="2" charset="0"/>
-              <a:ea typeface="CMU Sans Serif" panose="02000603000000000000" pitchFamily="2" charset="0"/>
-              <a:cs typeface="CMU Sans Serif" panose="02000603000000000000" pitchFamily="2" charset="0"/>
-            </a:endParaRPr>
           </a:p>
         </p:txBody>
       </p:sp>
@@ -7385,14 +7218,6 @@
               </a:rPr>
               <a:t>Admin Mgr</a:t>
             </a:r>
-            <a:endParaRPr lang="fr-FR" sz="1400" dirty="0" smtClean="0">
-              <a:solidFill>
-                <a:srgbClr val="000000"/>
-              </a:solidFill>
-              <a:latin typeface="CMU Sans Serif" panose="02000603000000000000" pitchFamily="2" charset="0"/>
-              <a:ea typeface="CMU Sans Serif" panose="02000603000000000000" pitchFamily="2" charset="0"/>
-              <a:cs typeface="CMU Sans Serif" panose="02000603000000000000" pitchFamily="2" charset="0"/>
-            </a:endParaRPr>
           </a:p>
         </p:txBody>
       </p:sp>
@@ -7568,10 +7393,19 @@
                 <a:ea typeface="CMU Sans Serif" panose="02000603000000000000" pitchFamily="2" charset="0"/>
                 <a:cs typeface="CMU Sans Serif" panose="02000603000000000000" pitchFamily="2" charset="0"/>
               </a:rPr>
-              <a:t>Dom0 - </a:t>
-            </a:r>
-          </a:p>
-          <a:p>
+              <a:t>Dom0 </a:t>
+            </a:r>
+            <a:r>
+              <a:rPr lang="fr-FR" sz="1600" dirty="0" smtClean="0">
+                <a:solidFill>
+                  <a:srgbClr val="000000"/>
+                </a:solidFill>
+                <a:latin typeface="CMU Sans Serif" panose="02000603000000000000" pitchFamily="2" charset="0"/>
+                <a:ea typeface="CMU Sans Serif" panose="02000603000000000000" pitchFamily="2" charset="0"/>
+                <a:cs typeface="CMU Sans Serif" panose="02000603000000000000" pitchFamily="2" charset="0"/>
+              </a:rPr>
+              <a:t>- </a:t>
+            </a:r>
             <a:r>
               <a:rPr lang="fr-FR" sz="1600" dirty="0" err="1" smtClean="0">
                 <a:solidFill>
@@ -7655,18 +7489,7 @@
                 <a:ea typeface="CMU Sans Serif" panose="02000603000000000000" pitchFamily="2" charset="0"/>
                 <a:cs typeface="CMU Sans Serif" panose="02000603000000000000" pitchFamily="2" charset="0"/>
               </a:rPr>
-              <a:t> &amp; OS </a:t>
-            </a:r>
-            <a:r>
-              <a:rPr lang="fr-FR" sz="1600" dirty="0" smtClean="0">
-                <a:solidFill>
-                  <a:schemeClr val="bg1"/>
-                </a:solidFill>
-                <a:latin typeface="CMU Sans Serif" panose="02000603000000000000" pitchFamily="2" charset="0"/>
-                <a:ea typeface="CMU Sans Serif" panose="02000603000000000000" pitchFamily="2" charset="0"/>
-                <a:cs typeface="CMU Sans Serif" panose="02000603000000000000" pitchFamily="2" charset="0"/>
-              </a:rPr>
-              <a:t>(PIP)</a:t>
+              <a:t> &amp; OS (PIP)</a:t>
             </a:r>
           </a:p>
         </p:txBody>
@@ -7725,18 +7548,7 @@
                 <a:ea typeface="CMU Sans Serif" panose="02000603000000000000" pitchFamily="2" charset="0"/>
                 <a:cs typeface="CMU Sans Serif" panose="02000603000000000000" pitchFamily="2" charset="0"/>
               </a:rPr>
-              <a:t>Dom1 </a:t>
-            </a:r>
-            <a:r>
-              <a:rPr lang="fr-FR" sz="1600" dirty="0" smtClean="0">
-                <a:solidFill>
-                  <a:srgbClr val="000000"/>
-                </a:solidFill>
-                <a:latin typeface="CMU Sans Serif" panose="02000603000000000000" pitchFamily="2" charset="0"/>
-                <a:ea typeface="CMU Sans Serif" panose="02000603000000000000" pitchFamily="2" charset="0"/>
-                <a:cs typeface="CMU Sans Serif" panose="02000603000000000000" pitchFamily="2" charset="0"/>
-              </a:rPr>
-              <a:t>– </a:t>
+              <a:t>Dom1 – </a:t>
             </a:r>
             <a:r>
               <a:rPr lang="fr-FR" sz="1600" dirty="0" err="1" smtClean="0">
@@ -7814,29 +7626,7 @@
                 <a:ea typeface="CMU Sans Serif" panose="02000603000000000000" pitchFamily="2" charset="0"/>
                 <a:cs typeface="CMU Sans Serif" panose="02000603000000000000" pitchFamily="2" charset="0"/>
               </a:rPr>
-              <a:t>Dom2 </a:t>
-            </a:r>
-            <a:r>
-              <a:rPr lang="fr-FR" sz="1600" dirty="0" smtClean="0">
-                <a:solidFill>
-                  <a:srgbClr val="000000"/>
-                </a:solidFill>
-                <a:latin typeface="CMU Sans Serif" panose="02000603000000000000" pitchFamily="2" charset="0"/>
-                <a:ea typeface="CMU Sans Serif" panose="02000603000000000000" pitchFamily="2" charset="0"/>
-                <a:cs typeface="CMU Sans Serif" panose="02000603000000000000" pitchFamily="2" charset="0"/>
-              </a:rPr>
-              <a:t>– </a:t>
-            </a:r>
-            <a:r>
-              <a:rPr lang="fr-FR" sz="1600" dirty="0" smtClean="0">
-                <a:solidFill>
-                  <a:srgbClr val="000000"/>
-                </a:solidFill>
-                <a:latin typeface="CMU Sans Serif" panose="02000603000000000000" pitchFamily="2" charset="0"/>
-                <a:ea typeface="CMU Sans Serif" panose="02000603000000000000" pitchFamily="2" charset="0"/>
-                <a:cs typeface="CMU Sans Serif" panose="02000603000000000000" pitchFamily="2" charset="0"/>
-              </a:rPr>
-              <a:t>Service </a:t>
+              <a:t>Dom2 – Service </a:t>
             </a:r>
             <a:r>
               <a:rPr lang="fr-FR" sz="1600" dirty="0" err="1" smtClean="0">
@@ -7977,7 +7767,7 @@
                 <a:ea typeface="CMU Sans Serif" panose="02000603000000000000" pitchFamily="2" charset="0"/>
                 <a:cs typeface="CMU Sans Serif" panose="02000603000000000000" pitchFamily="2" charset="0"/>
               </a:rPr>
-              <a:t>Dom2 CM</a:t>
+              <a:t>Dom1 CM</a:t>
             </a:r>
           </a:p>
         </p:txBody>
@@ -8030,6 +7820,17 @@
           <a:p>
             <a:pPr algn="ctr"/>
             <a:r>
+              <a:rPr lang="fr-FR" sz="1400" smtClean="0">
+                <a:solidFill>
+                  <a:srgbClr val="000000"/>
+                </a:solidFill>
+                <a:latin typeface="CMU Sans Serif" panose="02000603000000000000" pitchFamily="2" charset="0"/>
+                <a:ea typeface="CMU Sans Serif" panose="02000603000000000000" pitchFamily="2" charset="0"/>
+                <a:cs typeface="CMU Sans Serif" panose="02000603000000000000" pitchFamily="2" charset="0"/>
+              </a:rPr>
+              <a:t>Dom2 </a:t>
+            </a:r>
+            <a:r>
               <a:rPr lang="fr-FR" sz="1400" dirty="0" smtClean="0">
                 <a:solidFill>
                   <a:srgbClr val="000000"/>
@@ -8038,7 +7839,7 @@
                 <a:ea typeface="CMU Sans Serif" panose="02000603000000000000" pitchFamily="2" charset="0"/>
                 <a:cs typeface="CMU Sans Serif" panose="02000603000000000000" pitchFamily="2" charset="0"/>
               </a:rPr>
-              <a:t>Dom3 CM</a:t>
+              <a:t>CM</a:t>
             </a:r>
           </a:p>
         </p:txBody>
@@ -8100,14 +7901,6 @@
               </a:rPr>
               <a:t>Sens. Driver</a:t>
             </a:r>
-            <a:endParaRPr lang="fr-FR" sz="1400" dirty="0" smtClean="0">
-              <a:solidFill>
-                <a:srgbClr val="000000"/>
-              </a:solidFill>
-              <a:latin typeface="CMU Sans Serif" panose="02000603000000000000" pitchFamily="2" charset="0"/>
-              <a:ea typeface="CMU Sans Serif" panose="02000603000000000000" pitchFamily="2" charset="0"/>
-              <a:cs typeface="CMU Sans Serif" panose="02000603000000000000" pitchFamily="2" charset="0"/>
-            </a:endParaRPr>
           </a:p>
         </p:txBody>
       </p:sp>
@@ -8246,14 +8039,6 @@
               </a:rPr>
               <a:t> Sens Mgr</a:t>
             </a:r>
-            <a:endParaRPr lang="fr-FR" sz="1400" dirty="0" smtClean="0">
-              <a:solidFill>
-                <a:srgbClr val="000000"/>
-              </a:solidFill>
-              <a:latin typeface="CMU Sans Serif" panose="02000603000000000000" pitchFamily="2" charset="0"/>
-              <a:ea typeface="CMU Sans Serif" panose="02000603000000000000" pitchFamily="2" charset="0"/>
-              <a:cs typeface="CMU Sans Serif" panose="02000603000000000000" pitchFamily="2" charset="0"/>
-            </a:endParaRPr>
           </a:p>
         </p:txBody>
       </p:sp>
@@ -8347,14 +8132,6 @@
               </a:rPr>
               <a:t> Mgr</a:t>
             </a:r>
-            <a:endParaRPr lang="fr-FR" sz="1400" dirty="0" smtClean="0">
-              <a:solidFill>
-                <a:srgbClr val="000000"/>
-              </a:solidFill>
-              <a:latin typeface="CMU Sans Serif" panose="02000603000000000000" pitchFamily="2" charset="0"/>
-              <a:ea typeface="CMU Sans Serif" panose="02000603000000000000" pitchFamily="2" charset="0"/>
-              <a:cs typeface="CMU Sans Serif" panose="02000603000000000000" pitchFamily="2" charset="0"/>
-            </a:endParaRPr>
           </a:p>
         </p:txBody>
       </p:sp>
@@ -8426,14 +8203,6 @@
               </a:rPr>
               <a:t>. Driver</a:t>
             </a:r>
-            <a:endParaRPr lang="fr-FR" sz="1400" dirty="0" smtClean="0">
-              <a:solidFill>
-                <a:srgbClr val="000000"/>
-              </a:solidFill>
-              <a:latin typeface="CMU Sans Serif" panose="02000603000000000000" pitchFamily="2" charset="0"/>
-              <a:ea typeface="CMU Sans Serif" panose="02000603000000000000" pitchFamily="2" charset="0"/>
-              <a:cs typeface="CMU Sans Serif" panose="02000603000000000000" pitchFamily="2" charset="0"/>
-            </a:endParaRPr>
           </a:p>
         </p:txBody>
       </p:sp>
@@ -8494,14 +8263,6 @@
               </a:rPr>
               <a:t>NW Driver</a:t>
             </a:r>
-            <a:endParaRPr lang="fr-FR" sz="1400" dirty="0" smtClean="0">
-              <a:solidFill>
-                <a:srgbClr val="000000"/>
-              </a:solidFill>
-              <a:latin typeface="CMU Sans Serif" panose="02000603000000000000" pitchFamily="2" charset="0"/>
-              <a:ea typeface="CMU Sans Serif" panose="02000603000000000000" pitchFamily="2" charset="0"/>
-              <a:cs typeface="CMU Sans Serif" panose="02000603000000000000" pitchFamily="2" charset="0"/>
-            </a:endParaRPr>
           </a:p>
         </p:txBody>
       </p:sp>
@@ -8664,14 +8425,6 @@
               </a:rPr>
               <a:t>Updater</a:t>
             </a:r>
-            <a:endParaRPr lang="fr-FR" sz="1400" dirty="0" smtClean="0">
-              <a:solidFill>
-                <a:srgbClr val="000000"/>
-              </a:solidFill>
-              <a:latin typeface="CMU Sans Serif" panose="02000603000000000000" pitchFamily="2" charset="0"/>
-              <a:ea typeface="CMU Sans Serif" panose="02000603000000000000" pitchFamily="2" charset="0"/>
-              <a:cs typeface="CMU Sans Serif" panose="02000603000000000000" pitchFamily="2" charset="0"/>
-            </a:endParaRPr>
           </a:p>
         </p:txBody>
       </p:sp>
@@ -8765,14 +8518,6 @@
               </a:rPr>
               <a:t> Updater</a:t>
             </a:r>
-            <a:endParaRPr lang="fr-FR" sz="1400" dirty="0" smtClean="0">
-              <a:solidFill>
-                <a:srgbClr val="000000"/>
-              </a:solidFill>
-              <a:latin typeface="CMU Sans Serif" panose="02000603000000000000" pitchFamily="2" charset="0"/>
-              <a:ea typeface="CMU Sans Serif" panose="02000603000000000000" pitchFamily="2" charset="0"/>
-              <a:cs typeface="CMU Sans Serif" panose="02000603000000000000" pitchFamily="2" charset="0"/>
-            </a:endParaRPr>
           </a:p>
         </p:txBody>
       </p:sp>
@@ -8844,14 +8589,6 @@
               </a:rPr>
               <a:t> Sens</a:t>
             </a:r>
-            <a:endParaRPr lang="fr-FR" sz="1400" dirty="0" smtClean="0">
-              <a:solidFill>
-                <a:srgbClr val="000000"/>
-              </a:solidFill>
-              <a:latin typeface="CMU Sans Serif" panose="02000603000000000000" pitchFamily="2" charset="0"/>
-              <a:ea typeface="CMU Sans Serif" panose="02000603000000000000" pitchFamily="2" charset="0"/>
-              <a:cs typeface="CMU Sans Serif" panose="02000603000000000000" pitchFamily="2" charset="0"/>
-            </a:endParaRPr>
           </a:p>
         </p:txBody>
       </p:sp>
@@ -9002,14 +8739,6 @@
               </a:rPr>
               <a:t>App2</a:t>
             </a:r>
-            <a:endParaRPr lang="fr-FR" sz="1400" dirty="0" smtClean="0">
-              <a:solidFill>
-                <a:srgbClr val="000000"/>
-              </a:solidFill>
-              <a:latin typeface="CMU Sans Serif" panose="02000603000000000000" pitchFamily="2" charset="0"/>
-              <a:ea typeface="CMU Sans Serif" panose="02000603000000000000" pitchFamily="2" charset="0"/>
-              <a:cs typeface="CMU Sans Serif" panose="02000603000000000000" pitchFamily="2" charset="0"/>
-            </a:endParaRPr>
           </a:p>
         </p:txBody>
       </p:sp>
@@ -9079,27 +8808,8 @@
                 <a:ea typeface="CMU Sans Serif" panose="02000603000000000000" pitchFamily="2" charset="0"/>
                 <a:cs typeface="CMU Sans Serif" panose="02000603000000000000" pitchFamily="2" charset="0"/>
               </a:rPr>
-              <a:t> NW</a:t>
-            </a:r>
-            <a:r>
-              <a:rPr lang="fr-FR" sz="1400" dirty="0" smtClean="0">
-                <a:solidFill>
-                  <a:srgbClr val="000000"/>
-                </a:solidFill>
-                <a:latin typeface="CMU Sans Serif" panose="02000603000000000000" pitchFamily="2" charset="0"/>
-                <a:ea typeface="CMU Sans Serif" panose="02000603000000000000" pitchFamily="2" charset="0"/>
-                <a:cs typeface="CMU Sans Serif" panose="02000603000000000000" pitchFamily="2" charset="0"/>
-              </a:rPr>
-              <a:t> Mgr</a:t>
-            </a:r>
-            <a:endParaRPr lang="fr-FR" sz="1400" dirty="0" smtClean="0">
-              <a:solidFill>
-                <a:srgbClr val="000000"/>
-              </a:solidFill>
-              <a:latin typeface="CMU Sans Serif" panose="02000603000000000000" pitchFamily="2" charset="0"/>
-              <a:ea typeface="CMU Sans Serif" panose="02000603000000000000" pitchFamily="2" charset="0"/>
-              <a:cs typeface="CMU Sans Serif" panose="02000603000000000000" pitchFamily="2" charset="0"/>
-            </a:endParaRPr>
+              <a:t> NW Mgr</a:t>
+            </a:r>
           </a:p>
         </p:txBody>
       </p:sp>
@@ -9229,14 +8939,6 @@
               </a:rPr>
               <a:t>.</a:t>
             </a:r>
-            <a:endParaRPr lang="fr-FR" sz="1400" dirty="0" smtClean="0">
-              <a:solidFill>
-                <a:srgbClr val="000000"/>
-              </a:solidFill>
-              <a:latin typeface="CMU Sans Serif" panose="02000603000000000000" pitchFamily="2" charset="0"/>
-              <a:ea typeface="CMU Sans Serif" panose="02000603000000000000" pitchFamily="2" charset="0"/>
-              <a:cs typeface="CMU Sans Serif" panose="02000603000000000000" pitchFamily="2" charset="0"/>
-            </a:endParaRPr>
           </a:p>
         </p:txBody>
       </p:sp>
@@ -9381,14 +9083,6 @@
               </a:rPr>
               <a:t>Admin Mgr</a:t>
             </a:r>
-            <a:endParaRPr lang="fr-FR" sz="1400" dirty="0" smtClean="0">
-              <a:solidFill>
-                <a:srgbClr val="000000"/>
-              </a:solidFill>
-              <a:latin typeface="CMU Sans Serif" panose="02000603000000000000" pitchFamily="2" charset="0"/>
-              <a:ea typeface="CMU Sans Serif" panose="02000603000000000000" pitchFamily="2" charset="0"/>
-              <a:cs typeface="CMU Sans Serif" panose="02000603000000000000" pitchFamily="2" charset="0"/>
-            </a:endParaRPr>
           </a:p>
         </p:txBody>
       </p:sp>
@@ -9594,14 +9288,6 @@
               </a:rPr>
               <a:t>.</a:t>
             </a:r>
-            <a:endParaRPr lang="fr-FR" sz="1400" dirty="0" smtClean="0">
-              <a:solidFill>
-                <a:srgbClr val="000000"/>
-              </a:solidFill>
-              <a:latin typeface="CMU Sans Serif" panose="02000603000000000000" pitchFamily="2" charset="0"/>
-              <a:ea typeface="CMU Sans Serif" panose="02000603000000000000" pitchFamily="2" charset="0"/>
-              <a:cs typeface="CMU Sans Serif" panose="02000603000000000000" pitchFamily="2" charset="0"/>
-            </a:endParaRPr>
           </a:p>
         </p:txBody>
       </p:sp>
@@ -9746,14 +9432,6 @@
               </a:rPr>
               <a:t>Admin Mgr</a:t>
             </a:r>
-            <a:endParaRPr lang="fr-FR" sz="1400" dirty="0" smtClean="0">
-              <a:solidFill>
-                <a:srgbClr val="000000"/>
-              </a:solidFill>
-              <a:latin typeface="CMU Sans Serif" panose="02000603000000000000" pitchFamily="2" charset="0"/>
-              <a:ea typeface="CMU Sans Serif" panose="02000603000000000000" pitchFamily="2" charset="0"/>
-              <a:cs typeface="CMU Sans Serif" panose="02000603000000000000" pitchFamily="2" charset="0"/>
-            </a:endParaRPr>
           </a:p>
         </p:txBody>
       </p:sp>
@@ -9963,14 +9641,6 @@
               </a:rPr>
               <a:t>.</a:t>
             </a:r>
-            <a:endParaRPr lang="fr-FR" sz="1400" dirty="0" smtClean="0">
-              <a:solidFill>
-                <a:srgbClr val="000000"/>
-              </a:solidFill>
-              <a:latin typeface="CMU Sans Serif" panose="02000603000000000000" pitchFamily="2" charset="0"/>
-              <a:ea typeface="CMU Sans Serif" panose="02000603000000000000" pitchFamily="2" charset="0"/>
-              <a:cs typeface="CMU Sans Serif" panose="02000603000000000000" pitchFamily="2" charset="0"/>
-            </a:endParaRPr>
           </a:p>
         </p:txBody>
       </p:sp>
@@ -10123,14 +9793,6 @@
               </a:rPr>
               <a:t>Admin Mgr</a:t>
             </a:r>
-            <a:endParaRPr lang="fr-FR" sz="1400" dirty="0" smtClean="0">
-              <a:solidFill>
-                <a:srgbClr val="000000"/>
-              </a:solidFill>
-              <a:latin typeface="CMU Sans Serif" panose="02000603000000000000" pitchFamily="2" charset="0"/>
-              <a:ea typeface="CMU Sans Serif" panose="02000603000000000000" pitchFamily="2" charset="0"/>
-              <a:cs typeface="CMU Sans Serif" panose="02000603000000000000" pitchFamily="2" charset="0"/>
-            </a:endParaRPr>
           </a:p>
         </p:txBody>
       </p:sp>

</xml_diff>